<commit_message>
pour le s de résultats
</commit_message>
<xml_diff>
--- a/Detection de fraude.pptx
+++ b/Detection de fraude.pptx
@@ -2151,11 +2151,11 @@
     <dgm:cxn modelId="{2CDF7E13-B3EE-4E1A-9B8E-44B16D49E000}" srcId="{44E8AE4F-7175-45F9-8FA3-E8CEA699FC15}" destId="{99622335-B4AE-4673-86EE-B9E7F7676E1F}" srcOrd="2" destOrd="0" parTransId="{5395EB15-9439-498C-A93C-4FC7A283C333}" sibTransId="{9E692103-E40C-4037-AAB6-7CD9E82DD093}"/>
     <dgm:cxn modelId="{A2F28A21-2BA3-44A0-97B2-4DC9F281D950}" type="presOf" srcId="{44E8AE4F-7175-45F9-8FA3-E8CEA699FC15}" destId="{622F1B03-F28C-4AF1-9C8D-B72B6242BD67}" srcOrd="0" destOrd="0" presId="urn:microsoft.com/office/officeart/2018/2/layout/IconLabelList"/>
     <dgm:cxn modelId="{2E849F3D-AE48-4FB4-9AD6-FB76C85BD2C2}" srcId="{44E8AE4F-7175-45F9-8FA3-E8CEA699FC15}" destId="{35CCB681-FC98-425D-8312-77409AB6158D}" srcOrd="4" destOrd="0" parTransId="{6AB9C2BC-86FC-4F96-95EC-87F6CB5F9F84}" sibTransId="{31B999BB-E751-436D-9E7C-63180FE55C9D}"/>
-    <dgm:cxn modelId="{6914D661-0CC5-4488-B808-7D66BEDD5D93}" srcId="{44E8AE4F-7175-45F9-8FA3-E8CEA699FC15}" destId="{0BD7B661-66E7-46E4-AB6F-1964DDD1D136}" srcOrd="0" destOrd="0" parTransId="{0D05FA74-EC41-45B7-A981-861E45567B7E}" sibTransId="{5B6BCCD4-74DC-43D7-956F-F712D2A06C42}"/>
-    <dgm:cxn modelId="{D9C5C964-E361-4CB9-B1A8-4BE1E46D6CA6}" type="presOf" srcId="{99622335-B4AE-4673-86EE-B9E7F7676E1F}" destId="{91DF9092-69C1-436F-90D1-4B3BC8E52E7A}" srcOrd="0" destOrd="0" presId="urn:microsoft.com/office/officeart/2018/2/layout/IconLabelList"/>
     <dgm:cxn modelId="{CA8FDD44-1F82-469E-BF27-74B3A458D80B}" srcId="{44E8AE4F-7175-45F9-8FA3-E8CEA699FC15}" destId="{8F0C5A3C-6AE2-41E8-AD8D-BF6423EB21EC}" srcOrd="1" destOrd="0" parTransId="{51FE44FD-0CB8-49E6-843B-E8A509EE6C30}" sibTransId="{5248D3EB-15EF-478E-9CD4-3522715B9DB9}"/>
     <dgm:cxn modelId="{26EB3A46-1F6B-4076-B756-6D52E30C3DA7}" srcId="{44E8AE4F-7175-45F9-8FA3-E8CEA699FC15}" destId="{B12154EE-FCDB-42A4-BBAE-BDE31A324E61}" srcOrd="3" destOrd="0" parTransId="{C6792FF8-400B-4BE9-97A6-35DA86C65D74}" sibTransId="{3FAC96F7-E14F-4D39-9C22-DB7157779EB0}"/>
     <dgm:cxn modelId="{4FE0F44E-5F6B-45E3-A845-F4534136E9DC}" type="presOf" srcId="{0BD7B661-66E7-46E4-AB6F-1964DDD1D136}" destId="{B50750EC-46C7-48AB-95A6-6333CEDEDE9C}" srcOrd="0" destOrd="0" presId="urn:microsoft.com/office/officeart/2018/2/layout/IconLabelList"/>
+    <dgm:cxn modelId="{6914D661-0CC5-4488-B808-7D66BEDD5D93}" srcId="{44E8AE4F-7175-45F9-8FA3-E8CEA699FC15}" destId="{0BD7B661-66E7-46E4-AB6F-1964DDD1D136}" srcOrd="0" destOrd="0" parTransId="{0D05FA74-EC41-45B7-A981-861E45567B7E}" sibTransId="{5B6BCCD4-74DC-43D7-956F-F712D2A06C42}"/>
+    <dgm:cxn modelId="{D9C5C964-E361-4CB9-B1A8-4BE1E46D6CA6}" type="presOf" srcId="{99622335-B4AE-4673-86EE-B9E7F7676E1F}" destId="{91DF9092-69C1-436F-90D1-4B3BC8E52E7A}" srcOrd="0" destOrd="0" presId="urn:microsoft.com/office/officeart/2018/2/layout/IconLabelList"/>
     <dgm:cxn modelId="{5E298B99-E2E4-4327-A1FB-F057892524F7}" type="presOf" srcId="{8F0C5A3C-6AE2-41E8-AD8D-BF6423EB21EC}" destId="{525243AD-DD89-40D3-A73F-84E4B6CF51B6}" srcOrd="0" destOrd="0" presId="urn:microsoft.com/office/officeart/2018/2/layout/IconLabelList"/>
     <dgm:cxn modelId="{44CB67B1-774D-45D1-BA69-4F0B63CF43BB}" type="presOf" srcId="{B12154EE-FCDB-42A4-BBAE-BDE31A324E61}" destId="{A049260C-3308-4FB6-B087-3AE94D5DE0D8}" srcOrd="0" destOrd="0" presId="urn:microsoft.com/office/officeart/2018/2/layout/IconLabelList"/>
     <dgm:cxn modelId="{D8EB48D1-9BFB-4BA7-A7D5-A9C63D978553}" type="presOf" srcId="{35CCB681-FC98-425D-8312-77409AB6158D}" destId="{EB2349FA-39AD-4FDC-B0D5-AE236749C32D}" srcOrd="0" destOrd="0" presId="urn:microsoft.com/office/officeart/2018/2/layout/IconLabelList"/>
@@ -6262,7 +6262,7 @@
           <a:p>
             <a:fld id="{02AC24A9-CCB6-4F8D-B8DB-C2F3692CFA5A}" type="datetimeFigureOut">
               <a:rPr lang="en-US" smtClean="0"/>
-              <a:t>12/8/2021</a:t>
+              <a:t>12/8/21</a:t>
             </a:fld>
             <a:endParaRPr lang="en-US" dirty="0"/>
           </a:p>
@@ -6632,7 +6632,7 @@
           <a:p>
             <a:fld id="{02AC24A9-CCB6-4F8D-B8DB-C2F3692CFA5A}" type="datetimeFigureOut">
               <a:rPr lang="en-US" smtClean="0"/>
-              <a:t>12/8/2021</a:t>
+              <a:t>12/8/21</a:t>
             </a:fld>
             <a:endParaRPr lang="en-US"/>
           </a:p>
@@ -6841,7 +6841,7 @@
           <a:p>
             <a:fld id="{02AC24A9-CCB6-4F8D-B8DB-C2F3692CFA5A}" type="datetimeFigureOut">
               <a:rPr lang="en-US" smtClean="0"/>
-              <a:t>12/8/2021</a:t>
+              <a:t>12/8/21</a:t>
             </a:fld>
             <a:endParaRPr lang="en-US"/>
           </a:p>
@@ -7311,7 +7311,7 @@
           <a:p>
             <a:fld id="{02AC24A9-CCB6-4F8D-B8DB-C2F3692CFA5A}" type="datetimeFigureOut">
               <a:rPr lang="en-US" smtClean="0"/>
-              <a:t>12/8/2021</a:t>
+              <a:t>12/8/21</a:t>
             </a:fld>
             <a:endParaRPr lang="en-US"/>
           </a:p>
@@ -7765,7 +7765,7 @@
           <a:p>
             <a:fld id="{02AC24A9-CCB6-4F8D-B8DB-C2F3692CFA5A}" type="datetimeFigureOut">
               <a:rPr lang="en-US" smtClean="0"/>
-              <a:t>12/8/2021</a:t>
+              <a:t>12/8/21</a:t>
             </a:fld>
             <a:endParaRPr lang="en-US"/>
           </a:p>
@@ -8297,7 +8297,7 @@
           <a:p>
             <a:fld id="{02AC24A9-CCB6-4F8D-B8DB-C2F3692CFA5A}" type="datetimeFigureOut">
               <a:rPr lang="en-US" smtClean="0"/>
-              <a:t>12/8/2021</a:t>
+              <a:t>12/8/21</a:t>
             </a:fld>
             <a:endParaRPr lang="en-US"/>
           </a:p>
@@ -8996,7 +8996,7 @@
           <a:p>
             <a:fld id="{02AC24A9-CCB6-4F8D-B8DB-C2F3692CFA5A}" type="datetimeFigureOut">
               <a:rPr lang="en-US" smtClean="0"/>
-              <a:t>12/8/2021</a:t>
+              <a:t>12/8/21</a:t>
             </a:fld>
             <a:endParaRPr lang="en-US"/>
           </a:p>
@@ -9325,7 +9325,7 @@
           <a:p>
             <a:fld id="{02AC24A9-CCB6-4F8D-B8DB-C2F3692CFA5A}" type="datetimeFigureOut">
               <a:rPr lang="en-US" smtClean="0"/>
-              <a:t>12/8/2021</a:t>
+              <a:t>12/8/21</a:t>
             </a:fld>
             <a:endParaRPr lang="en-US"/>
           </a:p>
@@ -9438,7 +9438,7 @@
           <a:p>
             <a:fld id="{02AC24A9-CCB6-4F8D-B8DB-C2F3692CFA5A}" type="datetimeFigureOut">
               <a:rPr lang="en-US" smtClean="0"/>
-              <a:t>12/8/2021</a:t>
+              <a:t>12/8/21</a:t>
             </a:fld>
             <a:endParaRPr lang="en-US"/>
           </a:p>
@@ -9933,7 +9933,7 @@
           <a:p>
             <a:fld id="{02AC24A9-CCB6-4F8D-B8DB-C2F3692CFA5A}" type="datetimeFigureOut">
               <a:rPr lang="en-US" smtClean="0"/>
-              <a:t>12/8/2021</a:t>
+              <a:t>12/8/21</a:t>
             </a:fld>
             <a:endParaRPr lang="en-US" dirty="0"/>
           </a:p>
@@ -10410,7 +10410,7 @@
           <a:p>
             <a:fld id="{02AC24A9-CCB6-4F8D-B8DB-C2F3692CFA5A}" type="datetimeFigureOut">
               <a:rPr lang="en-US" smtClean="0"/>
-              <a:t>12/8/2021</a:t>
+              <a:t>12/8/21</a:t>
             </a:fld>
             <a:endParaRPr lang="en-US"/>
           </a:p>
@@ -10653,7 +10653,7 @@
           <a:p>
             <a:fld id="{02AC24A9-CCB6-4F8D-B8DB-C2F3692CFA5A}" type="datetimeFigureOut">
               <a:rPr lang="en-US" smtClean="0"/>
-              <a:t>12/8/2021</a:t>
+              <a:t>12/8/21</a:t>
             </a:fld>
             <a:endParaRPr lang="en-US"/>
           </a:p>
@@ -12855,7 +12855,7 @@
                   <a:srgbClr val="292929"/>
                 </a:solidFill>
                 <a:effectLst/>
-                <a:latin typeface="charter"/>
+                <a:latin typeface="Charter"/>
               </a:rPr>
               <a:t>tf-idf</a:t>
             </a:r>
@@ -12875,7 +12875,7 @@
                   <a:srgbClr val="292929"/>
                 </a:solidFill>
                 <a:effectLst/>
-                <a:latin typeface="charter"/>
+                <a:latin typeface="Charter"/>
               </a:rPr>
               <a:t>x</a:t>
             </a:r>
@@ -12895,7 +12895,7 @@
                   <a:srgbClr val="292929"/>
                 </a:solidFill>
                 <a:effectLst/>
-                <a:latin typeface="charter"/>
+                <a:latin typeface="Charter"/>
               </a:rPr>
               <a:t>tf-idf</a:t>
             </a:r>
@@ -17654,7 +17654,7 @@
             </a:pPr>
             <a:r>
               <a:rPr lang="fr-FR" sz="1700" dirty="0"/>
-              <a:t>RÉSULTAT :</a:t>
+              <a:t>RÉSULTATS :</a:t>
             </a:r>
           </a:p>
           <a:p>

</xml_diff>